<commit_message>
ok this one looks kinda sexy
</commit_message>
<xml_diff>
--- a/final presentation b.pptx
+++ b/final presentation b.pptx
@@ -7635,6 +7635,14 @@
 <file path=ppt/slides/slide1.xml><?xml version="1.0" encoding="utf-8"?>
 <p:sld xmlns:a="http://schemas.openxmlformats.org/drawingml/2006/main" xmlns:r="http://schemas.openxmlformats.org/officeDocument/2006/relationships" xmlns:p="http://schemas.openxmlformats.org/presentationml/2006/main">
   <p:cSld>
+    <p:bg>
+      <p:bgPr>
+        <a:solidFill>
+          <a:schemeClr val="bg2"/>
+        </a:solidFill>
+        <a:effectLst/>
+      </p:bgPr>
+    </p:bg>
     <p:spTree>
       <p:nvGrpSpPr>
         <p:cNvPr id="1" name=""/>
@@ -7649,6 +7657,259 @@
           <a:chExt cx="0" cy="0"/>
         </a:xfrm>
       </p:grpSpPr>
+      <p:pic>
+        <p:nvPicPr>
+          <p:cNvPr id="4" name="Grafik 3">
+            <a:extLst>
+              <a:ext uri="{FF2B5EF4-FFF2-40B4-BE49-F238E27FC236}">
+                <a16:creationId xmlns:a16="http://schemas.microsoft.com/office/drawing/2014/main" id="{1719C15C-0295-4A3A-8379-D1CCED88ECD3}"/>
+              </a:ext>
+            </a:extLst>
+          </p:cNvPr>
+          <p:cNvPicPr>
+            <a:picLocks noChangeAspect="1"/>
+          </p:cNvPicPr>
+          <p:nvPr/>
+        </p:nvPicPr>
+        <p:blipFill rotWithShape="1">
+          <a:blip r:embed="rId2"/>
+          <a:srcRect t="26738" r="-2" b="18407"/>
+          <a:stretch/>
+        </p:blipFill>
+        <p:spPr>
+          <a:xfrm>
+            <a:off x="20" y="10"/>
+            <a:ext cx="12191980" cy="6859300"/>
+          </a:xfrm>
+          <a:prstGeom prst="rect">
+            <a:avLst/>
+          </a:prstGeom>
+        </p:spPr>
+      </p:pic>
+      <p:sp>
+        <p:nvSpPr>
+          <p:cNvPr id="9" name="Rectangle 8">
+            <a:extLst>
+              <a:ext uri="{FF2B5EF4-FFF2-40B4-BE49-F238E27FC236}">
+                <a16:creationId xmlns:a16="http://schemas.microsoft.com/office/drawing/2014/main" id="{310B1DD0-264A-47E3-A16A-C87AFA51E68A}"/>
+              </a:ext>
+              <a:ext uri="{C183D7F6-B498-43B3-948B-1728B52AA6E4}">
+                <adec:decorative xmlns:adec="http://schemas.microsoft.com/office/drawing/2017/decorative" val="1"/>
+              </a:ext>
+            </a:extLst>
+          </p:cNvPr>
+          <p:cNvSpPr>
+            <a:spLocks noGrp="1" noRot="1" noChangeAspect="1" noMove="1" noResize="1" noEditPoints="1" noAdjustHandles="1" noChangeArrowheads="1" noChangeShapeType="1" noTextEdit="1"/>
+          </p:cNvSpPr>
+          <p:nvPr>
+            <p:extLst>
+              <p:ext uri="{386F3935-93C4-4BCD-93E2-E3B085C9AB24}">
+                <p16:designElem xmlns:p16="http://schemas.microsoft.com/office/powerpoint/2015/main" val="1"/>
+              </p:ext>
+            </p:extLst>
+          </p:nvPr>
+        </p:nvSpPr>
+        <p:spPr bwMode="ltGray">
+          <a:xfrm>
+            <a:off x="-258" y="0"/>
+            <a:ext cx="12192000" cy="6858000"/>
+          </a:xfrm>
+          <a:prstGeom prst="rect">
+            <a:avLst/>
+          </a:prstGeom>
+          <a:gradFill flip="none" rotWithShape="1">
+            <a:gsLst>
+              <a:gs pos="20000">
+                <a:schemeClr val="tx2">
+                  <a:alpha val="70000"/>
+                </a:schemeClr>
+              </a:gs>
+              <a:gs pos="100000">
+                <a:schemeClr val="tx2"/>
+              </a:gs>
+            </a:gsLst>
+            <a:path path="circle">
+              <a:fillToRect l="50000" t="50000" r="50000" b="50000"/>
+            </a:path>
+            <a:tileRect/>
+          </a:gradFill>
+          <a:ln>
+            <a:noFill/>
+          </a:ln>
+        </p:spPr>
+        <p:style>
+          <a:lnRef idx="2">
+            <a:schemeClr val="accent1">
+              <a:shade val="50000"/>
+            </a:schemeClr>
+          </a:lnRef>
+          <a:fillRef idx="1">
+            <a:schemeClr val="accent1"/>
+          </a:fillRef>
+          <a:effectRef idx="0">
+            <a:schemeClr val="accent1"/>
+          </a:effectRef>
+          <a:fontRef idx="minor">
+            <a:schemeClr val="lt1"/>
+          </a:fontRef>
+        </p:style>
+        <p:txBody>
+          <a:bodyPr rtlCol="0" anchor="ctr"/>
+          <a:lstStyle/>
+          <a:p>
+            <a:pPr algn="ctr"/>
+            <a:endParaRPr lang="en-US"/>
+          </a:p>
+        </p:txBody>
+      </p:sp>
+      <p:sp>
+        <p:nvSpPr>
+          <p:cNvPr id="11" name="Freeform 6">
+            <a:extLst>
+              <a:ext uri="{FF2B5EF4-FFF2-40B4-BE49-F238E27FC236}">
+                <a16:creationId xmlns:a16="http://schemas.microsoft.com/office/drawing/2014/main" id="{69C1BB7B-F21E-41A2-B30C-D8507B960282}"/>
+              </a:ext>
+              <a:ext uri="{C183D7F6-B498-43B3-948B-1728B52AA6E4}">
+                <adec:decorative xmlns:adec="http://schemas.microsoft.com/office/drawing/2017/decorative" val="1"/>
+              </a:ext>
+            </a:extLst>
+          </p:cNvPr>
+          <p:cNvSpPr>
+            <a:spLocks noGrp="1" noRot="1" noChangeAspect="1" noMove="1" noResize="1" noEditPoints="1" noAdjustHandles="1" noChangeArrowheads="1" noChangeShapeType="1" noTextEdit="1"/>
+          </p:cNvSpPr>
+          <p:nvPr>
+            <p:extLst>
+              <p:ext uri="{386F3935-93C4-4BCD-93E2-E3B085C9AB24}">
+                <p16:designElem xmlns:p16="http://schemas.microsoft.com/office/powerpoint/2015/main" val="1"/>
+              </p:ext>
+            </p:extLst>
+          </p:nvPr>
+        </p:nvSpPr>
+        <p:spPr bwMode="auto">
+          <a:xfrm flipH="1" flipV="1">
+            <a:off x="752858" y="744469"/>
+            <a:ext cx="3275668" cy="4408488"/>
+          </a:xfrm>
+          <a:custGeom>
+            <a:avLst/>
+            <a:gdLst/>
+            <a:ahLst/>
+            <a:cxnLst/>
+            <a:rect l="l" t="t" r="r" b="b"/>
+            <a:pathLst>
+              <a:path w="10002" h="10000">
+                <a:moveTo>
+                  <a:pt x="8763" y="0"/>
+                </a:moveTo>
+                <a:lnTo>
+                  <a:pt x="10002" y="0"/>
+                </a:lnTo>
+                <a:lnTo>
+                  <a:pt x="10002" y="10000"/>
+                </a:lnTo>
+                <a:lnTo>
+                  <a:pt x="2" y="10000"/>
+                </a:lnTo>
+                <a:cubicBezTo>
+                  <a:pt x="-2" y="9698"/>
+                  <a:pt x="4" y="9427"/>
+                  <a:pt x="0" y="9125"/>
+                </a:cubicBezTo>
+                <a:lnTo>
+                  <a:pt x="8763" y="9128"/>
+                </a:lnTo>
+                <a:lnTo>
+                  <a:pt x="8763" y="0"/>
+                </a:lnTo>
+                <a:close/>
+              </a:path>
+            </a:pathLst>
+          </a:custGeom>
+          <a:solidFill>
+            <a:schemeClr val="bg2"/>
+          </a:solidFill>
+          <a:ln w="0">
+            <a:noFill/>
+            <a:prstDash val="solid"/>
+            <a:round/>
+            <a:headEnd/>
+            <a:tailEnd/>
+          </a:ln>
+        </p:spPr>
+      </p:sp>
+      <p:sp>
+        <p:nvSpPr>
+          <p:cNvPr id="13" name="Freeform 6">
+            <a:extLst>
+              <a:ext uri="{FF2B5EF4-FFF2-40B4-BE49-F238E27FC236}">
+                <a16:creationId xmlns:a16="http://schemas.microsoft.com/office/drawing/2014/main" id="{DF6D7DDE-F8A1-4105-9729-F9EB5F81A360}"/>
+              </a:ext>
+              <a:ext uri="{C183D7F6-B498-43B3-948B-1728B52AA6E4}">
+                <adec:decorative xmlns:adec="http://schemas.microsoft.com/office/drawing/2017/decorative" val="1"/>
+              </a:ext>
+            </a:extLst>
+          </p:cNvPr>
+          <p:cNvSpPr>
+            <a:spLocks noGrp="1" noRot="1" noChangeAspect="1" noMove="1" noResize="1" noEditPoints="1" noAdjustHandles="1" noChangeArrowheads="1" noChangeShapeType="1" noTextEdit="1"/>
+          </p:cNvSpPr>
+          <p:nvPr>
+            <p:extLst>
+              <p:ext uri="{386F3935-93C4-4BCD-93E2-E3B085C9AB24}">
+                <p16:designElem xmlns:p16="http://schemas.microsoft.com/office/powerpoint/2015/main" val="1"/>
+              </p:ext>
+            </p:extLst>
+          </p:nvPr>
+        </p:nvSpPr>
+        <p:spPr bwMode="auto">
+          <a:xfrm>
+            <a:off x="8151962" y="1685652"/>
+            <a:ext cx="3275013" cy="4408488"/>
+          </a:xfrm>
+          <a:custGeom>
+            <a:avLst/>
+            <a:gdLst/>
+            <a:ahLst/>
+            <a:cxnLst/>
+            <a:rect l="l" t="t" r="r" b="b"/>
+            <a:pathLst>
+              <a:path w="10000" h="10000">
+                <a:moveTo>
+                  <a:pt x="8761" y="0"/>
+                </a:moveTo>
+                <a:lnTo>
+                  <a:pt x="10000" y="0"/>
+                </a:lnTo>
+                <a:lnTo>
+                  <a:pt x="10000" y="10000"/>
+                </a:lnTo>
+                <a:lnTo>
+                  <a:pt x="0" y="10000"/>
+                </a:lnTo>
+                <a:lnTo>
+                  <a:pt x="0" y="9126"/>
+                </a:lnTo>
+                <a:lnTo>
+                  <a:pt x="8761" y="9127"/>
+                </a:lnTo>
+                <a:lnTo>
+                  <a:pt x="8761" y="0"/>
+                </a:lnTo>
+                <a:close/>
+              </a:path>
+            </a:pathLst>
+          </a:custGeom>
+          <a:solidFill>
+            <a:schemeClr val="bg2"/>
+          </a:solidFill>
+          <a:ln w="0">
+            <a:noFill/>
+            <a:prstDash val="solid"/>
+            <a:round/>
+            <a:headEnd/>
+            <a:tailEnd/>
+          </a:ln>
+        </p:spPr>
+      </p:sp>
       <p:sp>
         <p:nvSpPr>
           <p:cNvPr id="2" name="Titel 1">
@@ -7667,8 +7928,8 @@
         </p:nvSpPr>
         <p:spPr>
           <a:xfrm>
-            <a:off x="8086582" y="1314922"/>
-            <a:ext cx="3176246" cy="3000139"/>
+            <a:off x="1915128" y="1788454"/>
+            <a:ext cx="8361229" cy="2098226"/>
           </a:xfrm>
         </p:spPr>
         <p:txBody>
@@ -7677,12 +7938,14 @@
           </a:bodyPr>
           <a:lstStyle/>
           <a:p>
-            <a:pPr algn="l"/>
             <a:r>
-              <a:rPr lang="de-DE" sz="4100"/>
-              <a:t>K-means clustering project proposal</a:t>
+              <a:rPr lang="de-DE" sz="6100">
+                <a:solidFill>
+                  <a:schemeClr val="bg2"/>
+                </a:solidFill>
+              </a:rPr>
+              <a:t>K-means clustering Final presentation</a:t>
             </a:r>
-            <a:endParaRPr lang="de-DE" sz="4100" dirty="0"/>
           </a:p>
         </p:txBody>
       </p:sp>
@@ -7704,8 +7967,8 @@
         </p:nvSpPr>
         <p:spPr>
           <a:xfrm>
-            <a:off x="8086582" y="4458645"/>
-            <a:ext cx="3176246" cy="1656413"/>
+            <a:off x="2679906" y="3956279"/>
+            <a:ext cx="6831673" cy="1086237"/>
           </a:xfrm>
         </p:spPr>
         <p:txBody>
@@ -7714,66 +7977,18 @@
           </a:bodyPr>
           <a:lstStyle/>
           <a:p>
-            <a:pPr algn="l">
+            <a:pPr>
               <a:spcAft>
                 <a:spcPts val="600"/>
               </a:spcAft>
             </a:pPr>
             <a:r>
-              <a:rPr lang="de-DE" sz="2000" dirty="0">
+              <a:rPr lang="de-DE">
                 <a:solidFill>
-                  <a:schemeClr val="tx1"/>
+                  <a:schemeClr val="bg2"/>
                 </a:solidFill>
               </a:rPr>
-              <a:t>Data </a:t>
-            </a:r>
-            <a:r>
-              <a:rPr lang="de-DE" sz="2000" dirty="0" err="1">
-                <a:solidFill>
-                  <a:schemeClr val="tx1"/>
-                </a:solidFill>
-              </a:rPr>
-              <a:t>analysis</a:t>
-            </a:r>
-            <a:r>
-              <a:rPr lang="de-DE" sz="2000" dirty="0">
-                <a:solidFill>
-                  <a:schemeClr val="tx1"/>
-                </a:solidFill>
-              </a:rPr>
-              <a:t> </a:t>
-            </a:r>
-            <a:r>
-              <a:rPr lang="de-DE" sz="2000" dirty="0" err="1">
-                <a:solidFill>
-                  <a:schemeClr val="tx1"/>
-                </a:solidFill>
-              </a:rPr>
-              <a:t>project</a:t>
-            </a:r>
-            <a:r>
-              <a:rPr lang="de-DE" sz="2000" dirty="0">
-                <a:solidFill>
-                  <a:schemeClr val="tx1"/>
-                </a:solidFill>
-              </a:rPr>
-              <a:t> 4, </a:t>
-            </a:r>
-            <a:r>
-              <a:rPr lang="de-DE" sz="2000" dirty="0" err="1">
-                <a:solidFill>
-                  <a:schemeClr val="tx1"/>
-                </a:solidFill>
-              </a:rPr>
-              <a:t>group</a:t>
-            </a:r>
-            <a:r>
-              <a:rPr lang="de-DE" sz="2000" dirty="0">
-                <a:solidFill>
-                  <a:schemeClr val="tx1"/>
-                </a:solidFill>
-              </a:rPr>
-              <a:t> 2</a:t>
+              <a:t>Data analysis project 4, group 2</a:t>
             </a:r>
           </a:p>
         </p:txBody>

</xml_diff>